<commit_message>
Update Presentación Trabajo Fin De Grado David Corredor Miguel, Antonio Castillo y Francisco Leon.pptx
</commit_message>
<xml_diff>
--- a/Presentación Trabajo Fin De Grado David Corredor Miguel, Antonio Castillo y Francisco Leon.pptx
+++ b/Presentación Trabajo Fin De Grado David Corredor Miguel, Antonio Castillo y Francisco Leon.pptx
@@ -6189,13 +6189,8 @@
             <a:pPr algn="ctr"/>
             <a:r>
               <a:rPr lang="es-ES" sz="3600" dirty="0"/>
-              <a:t>Francisco </a:t>
-            </a:r>
-            <a:r>
-              <a:rPr lang="es-ES" sz="3600" dirty="0" err="1"/>
-              <a:t>Leon</a:t>
-            </a:r>
-            <a:endParaRPr lang="es-ES" sz="3600" dirty="0"/>
+              <a:t>Francisco León</a:t>
+            </a:r>
           </a:p>
         </p:txBody>
       </p:sp>
@@ -6262,7 +6257,7 @@
                   <a:srgbClr val="FF0000"/>
                 </a:solidFill>
               </a:rPr>
-              <a:t>Tecnología Utilizada</a:t>
+              <a:t>Tecnologías Utilizadas</a:t>
             </a:r>
           </a:p>
         </p:txBody>
@@ -6394,7 +6389,7 @@
                   <a:srgbClr val="FF0000"/>
                 </a:solidFill>
               </a:rPr>
-              <a:t>Tecnología Utilizada</a:t>
+              <a:t>Tecnologías Utilizadas</a:t>
             </a:r>
           </a:p>
         </p:txBody>
@@ -7311,7 +7306,7 @@
             </a:pPr>
             <a:r>
               <a:rPr lang="es-ES" sz="2400" dirty="0"/>
-              <a:t>Tecnología Utilizada</a:t>
+              <a:t>Tecnologías Utilizadas</a:t>
             </a:r>
           </a:p>
           <a:p>

</xml_diff>